<commit_message>
added backend(add to bin)
</commit_message>
<xml_diff>
--- a/Zapiska/Представление Exchange.pptx
+++ b/Zapiska/Представление Exchange.pptx
@@ -793,7 +793,7 @@
           <a:p>
             <a:fld id="{9E016143-E03C-4CFD-AFDC-14E5BDEA754C}" type="datetimeFigureOut">
               <a:rPr lang="en-US" dirty="0"/>
-              <a:t>4/25/2021</a:t>
+              <a:t>4/26/2021</a:t>
             </a:fld>
             <a:endParaRPr lang="en-US" dirty="0"/>
           </a:p>
@@ -1020,7 +1020,7 @@
           <a:p>
             <a:fld id="{C033E54A-A8CA-48C1-9504-691B58049D29}" type="datetimeFigureOut">
               <a:rPr lang="en-US" dirty="0"/>
-              <a:t>4/25/2021</a:t>
+              <a:t>4/26/2021</a:t>
             </a:fld>
             <a:endParaRPr lang="en-US" dirty="0"/>
           </a:p>
@@ -1198,7 +1198,7 @@
           <a:p>
             <a:fld id="{B5F6C806-BBF7-471C-9527-881CE2266695}" type="datetimeFigureOut">
               <a:rPr lang="en-US" dirty="0"/>
-              <a:t>4/25/2021</a:t>
+              <a:t>4/26/2021</a:t>
             </a:fld>
             <a:endParaRPr lang="en-US" dirty="0"/>
           </a:p>
@@ -1366,7 +1366,7 @@
           <a:p>
             <a:fld id="{78C94063-DF36-4330-A365-08DA1FA5B7D6}" type="datetimeFigureOut">
               <a:rPr lang="en-US" dirty="0"/>
-              <a:t>4/25/2021</a:t>
+              <a:t>4/26/2021</a:t>
             </a:fld>
             <a:endParaRPr lang="en-US" dirty="0"/>
           </a:p>
@@ -1619,7 +1619,7 @@
           <a:p>
             <a:fld id="{908A7C6C-0F39-4D70-8E8D-FE5B9C95FA73}" type="datetimeFigureOut">
               <a:rPr lang="en-US" dirty="0"/>
-              <a:t>4/25/2021</a:t>
+              <a:t>4/26/2021</a:t>
             </a:fld>
             <a:endParaRPr lang="en-US" dirty="0"/>
           </a:p>
@@ -1942,7 +1942,7 @@
           <a:p>
             <a:fld id="{DFCFA4AC-08CC-42CE-BD01-C191750A04EC}" type="datetimeFigureOut">
               <a:rPr lang="en-US" dirty="0"/>
-              <a:t>4/25/2021</a:t>
+              <a:t>4/26/2021</a:t>
             </a:fld>
             <a:endParaRPr lang="en-US" dirty="0"/>
           </a:p>
@@ -2390,7 +2390,7 @@
           <a:p>
             <a:fld id="{1BA7A723-92A7-435B-B681-F25B092FEFEB}" type="datetimeFigureOut">
               <a:rPr lang="en-US" dirty="0"/>
-              <a:t>4/25/2021</a:t>
+              <a:t>4/26/2021</a:t>
             </a:fld>
             <a:endParaRPr lang="en-US" dirty="0"/>
           </a:p>
@@ -2507,7 +2507,7 @@
           <a:p>
             <a:fld id="{4F170639-886C-4FCF-9EAB-ABB5DA3F3F4A}" type="datetimeFigureOut">
               <a:rPr lang="en-US" dirty="0"/>
-              <a:t>4/25/2021</a:t>
+              <a:t>4/26/2021</a:t>
             </a:fld>
             <a:endParaRPr lang="en-US" dirty="0"/>
           </a:p>
@@ -2602,7 +2602,7 @@
           <a:p>
             <a:fld id="{22230651-31F4-45D2-98AE-A2108F41BC07}" type="datetimeFigureOut">
               <a:rPr lang="en-US" dirty="0"/>
-              <a:t>4/25/2021</a:t>
+              <a:t>4/26/2021</a:t>
             </a:fld>
             <a:endParaRPr lang="en-US" dirty="0"/>
           </a:p>
@@ -2887,7 +2887,7 @@
           <a:p>
             <a:fld id="{6F53789A-C914-4DB1-8815-80B5EC7335C5}" type="datetimeFigureOut">
               <a:rPr lang="en-US" dirty="0"/>
-              <a:t>4/25/2021</a:t>
+              <a:t>4/26/2021</a:t>
             </a:fld>
             <a:endParaRPr lang="en-US" dirty="0"/>
           </a:p>
@@ -3207,7 +3207,7 @@
           <a:p>
             <a:fld id="{5E6440AA-91A0-436F-8FDB-C0F939DCAE21}" type="datetimeFigureOut">
               <a:rPr lang="en-US" dirty="0"/>
-              <a:t>4/25/2021</a:t>
+              <a:t>4/26/2021</a:t>
             </a:fld>
             <a:endParaRPr lang="en-US" dirty="0"/>
           </a:p>
@@ -3459,7 +3459,7 @@
           <a:p>
             <a:fld id="{0E59FD0C-5451-4CA0-86AF-E70AE3279989}" type="datetimeFigureOut">
               <a:rPr lang="en-US" dirty="0"/>
-              <a:t>4/25/2021</a:t>
+              <a:t>4/26/2021</a:t>
             </a:fld>
             <a:endParaRPr lang="en-US" dirty="0"/>
           </a:p>
@@ -3979,25 +3979,40 @@
           <a:p>
             <a:pPr algn="ctr"/>
             <a:r>
-              <a:rPr lang="ru-RU" sz="4400" dirty="0"/>
+              <a:rPr lang="ru-RU" sz="4400" dirty="0">
+                <a:latin typeface="Montserrat" panose="00000500000000000000" pitchFamily="2" charset="-52"/>
+              </a:rPr>
               <a:t>Проект </a:t>
             </a:r>
           </a:p>
           <a:p>
             <a:pPr algn="ctr"/>
             <a:r>
-              <a:rPr lang="ru-RU" sz="4400" dirty="0"/>
+              <a:rPr lang="ru-RU" sz="4400" dirty="0">
+                <a:latin typeface="Montserrat" panose="00000500000000000000" pitchFamily="2" charset="-52"/>
+              </a:rPr>
               <a:t>«</a:t>
             </a:r>
             <a:r>
-              <a:rPr lang="ru-RU" sz="4400" dirty="0" err="1"/>
-              <a:t>Exchange</a:t>
-            </a:r>
-            <a:r>
-              <a:rPr lang="ru-RU" sz="4400" dirty="0"/>
+              <a:rPr lang="ru-RU" sz="4400" b="1" i="1" dirty="0" err="1">
+                <a:latin typeface="Montserrat" panose="00000500000000000000" pitchFamily="2" charset="-52"/>
+              </a:rPr>
+              <a:t>Ex</a:t>
+            </a:r>
+            <a:r>
+              <a:rPr lang="ru-RU" sz="4400" dirty="0" err="1">
+                <a:latin typeface="Montserrat" panose="00000500000000000000" pitchFamily="2" charset="-52"/>
+              </a:rPr>
+              <a:t>change</a:t>
+            </a:r>
+            <a:r>
+              <a:rPr lang="ru-RU" sz="4400" dirty="0">
+                <a:latin typeface="Montserrat" panose="00000500000000000000" pitchFamily="2" charset="-52"/>
+              </a:rPr>
               <a:t>»</a:t>
             </a:r>
-            <a:endParaRPr lang="ru-RU" sz="4400">
+            <a:endParaRPr lang="ru-RU" sz="4400" dirty="0">
+              <a:latin typeface="Montserrat" panose="00000500000000000000" pitchFamily="2" charset="-52"/>
               <a:cs typeface="Calibri"/>
             </a:endParaRPr>
           </a:p>
@@ -4017,8 +4032,8 @@
         </p:nvSpPr>
         <p:spPr>
           <a:xfrm>
-            <a:off x="8363816" y="6213285"/>
-            <a:ext cx="3831104" cy="646331"/>
+            <a:off x="8360896" y="5438028"/>
+            <a:ext cx="3831104" cy="1200329"/>
           </a:xfrm>
           <a:prstGeom prst="rect">
             <a:avLst/>
@@ -4032,38 +4047,66 @@
           <a:lstStyle/>
           <a:p>
             <a:r>
-              <a:rPr lang="ru-RU" dirty="0"/>
+              <a:rPr lang="ru-RU" dirty="0">
+                <a:latin typeface="Montserrat" panose="00000500000000000000" pitchFamily="2" charset="-52"/>
+              </a:rPr>
               <a:t>Выполнил</a:t>
             </a:r>
             <a:r>
-              <a:rPr lang="en-US" dirty="0"/>
+              <a:rPr lang="en-US" dirty="0">
+                <a:latin typeface="Montserrat" panose="00000500000000000000" pitchFamily="2" charset="-52"/>
+              </a:rPr>
               <a:t>:</a:t>
             </a:r>
             <a:r>
-              <a:rPr lang="ru-RU" dirty="0"/>
+              <a:rPr lang="ru-RU" dirty="0">
+                <a:latin typeface="Montserrat" panose="00000500000000000000" pitchFamily="2" charset="-52"/>
+              </a:rPr>
+              <a:t> Мазурек В.А.</a:t>
+            </a:r>
+            <a:r>
+              <a:rPr lang="en-US" dirty="0">
+                <a:latin typeface="Montserrat" panose="00000500000000000000" pitchFamily="2" charset="-52"/>
+              </a:rPr>
+              <a:t>;</a:t>
+            </a:r>
+            <a:r>
+              <a:rPr lang="ru-RU" dirty="0">
+                <a:latin typeface="Montserrat" panose="00000500000000000000" pitchFamily="2" charset="-52"/>
+              </a:rPr>
+              <a:t> Глухов И.Н.</a:t>
+            </a:r>
+          </a:p>
+          <a:p>
+            <a:r>
+              <a:rPr lang="ru-RU" dirty="0">
+                <a:latin typeface="Montserrat" panose="00000500000000000000" pitchFamily="2" charset="-52"/>
+              </a:rPr>
+              <a:t>Преподаватель</a:t>
+            </a:r>
+            <a:r>
+              <a:rPr lang="en-US" dirty="0">
+                <a:latin typeface="Montserrat" panose="00000500000000000000" pitchFamily="2" charset="-52"/>
+              </a:rPr>
+              <a:t>:</a:t>
+            </a:r>
+            <a:r>
+              <a:rPr lang="ru-RU" dirty="0">
+                <a:latin typeface="Montserrat" panose="00000500000000000000" pitchFamily="2" charset="-52"/>
+              </a:rPr>
+              <a:t> Антон </a:t>
+            </a:r>
+            <a:r>
+              <a:rPr lang="en-US" dirty="0">
+                <a:latin typeface="Montserrat" panose="00000500000000000000" pitchFamily="2" charset="-52"/>
+              </a:rPr>
               <a:t> </a:t>
             </a:r>
             <a:r>
-              <a:rPr lang="ru-RU" dirty="0" err="1"/>
-              <a:t>Мазурек</a:t>
-            </a:r>
-            <a:r>
-              <a:rPr lang="ru-RU" dirty="0"/>
-              <a:t> В.А., Глухов И.Н.</a:t>
-            </a:r>
-          </a:p>
-          <a:p>
-            <a:r>
-              <a:rPr lang="ru-RU" dirty="0"/>
-              <a:t>Преподаватель</a:t>
-            </a:r>
-            <a:r>
-              <a:rPr lang="en-US" dirty="0"/>
-              <a:t>:</a:t>
-            </a:r>
-            <a:r>
-              <a:rPr lang="ru-RU" dirty="0"/>
-              <a:t> Осипов Антон</a:t>
+              <a:rPr lang="ru-RU" dirty="0">
+                <a:latin typeface="Montserrat" panose="00000500000000000000" pitchFamily="2" charset="-52"/>
+              </a:rPr>
+              <a:t>Осипов</a:t>
             </a:r>
           </a:p>
         </p:txBody>
@@ -4082,8 +4125,8 @@
         </p:nvSpPr>
         <p:spPr>
           <a:xfrm>
-            <a:off x="5601728" y="5715028"/>
-            <a:ext cx="988540" cy="646331"/>
+            <a:off x="5494712" y="5715028"/>
+            <a:ext cx="1202573" cy="646331"/>
           </a:xfrm>
           <a:prstGeom prst="rect">
             <a:avLst/>
@@ -4098,14 +4141,20 @@
           <a:p>
             <a:pPr algn="ctr"/>
             <a:r>
-              <a:rPr lang="ru-RU" dirty="0"/>
+              <a:rPr lang="ru-RU" dirty="0">
+                <a:latin typeface="Montserrat" panose="00000500000000000000" pitchFamily="2" charset="-52"/>
+              </a:rPr>
               <a:t>г. Сургут</a:t>
             </a:r>
             <a:br>
-              <a:rPr lang="ru-RU" dirty="0"/>
+              <a:rPr lang="ru-RU" dirty="0">
+                <a:latin typeface="Montserrat" panose="00000500000000000000" pitchFamily="2" charset="-52"/>
+              </a:rPr>
             </a:br>
             <a:r>
-              <a:rPr lang="ru-RU" dirty="0"/>
+              <a:rPr lang="ru-RU" dirty="0">
+                <a:latin typeface="Montserrat" panose="00000500000000000000" pitchFamily="2" charset="-52"/>
+              </a:rPr>
               <a:t>2020</a:t>
             </a:r>
           </a:p>
@@ -4126,7 +4175,7 @@
         <p:spPr>
           <a:xfrm>
             <a:off x="4335374" y="496641"/>
-            <a:ext cx="3521249" cy="461665"/>
+            <a:ext cx="3521249" cy="830997"/>
           </a:xfrm>
           <a:prstGeom prst="rect">
             <a:avLst/>
@@ -4140,19 +4189,24 @@
           <a:lstStyle/>
           <a:p>
             <a:r>
-              <a:rPr lang="ru-RU" sz="2400" dirty="0"/>
+              <a:rPr lang="ru-RU" sz="2400" dirty="0">
+                <a:latin typeface="Montserrat" panose="00000500000000000000" pitchFamily="2" charset="-52"/>
+              </a:rPr>
               <a:t>Площадка </a:t>
             </a:r>
             <a:r>
-              <a:rPr lang="ru-RU" sz="2400" dirty="0">
+              <a:rPr lang="ru-RU" sz="2400" b="1" dirty="0">
                 <a:solidFill>
                   <a:srgbClr val="FF0000"/>
                 </a:solidFill>
+                <a:latin typeface="Montserrat" panose="00000500000000000000" pitchFamily="2" charset="-52"/>
               </a:rPr>
               <a:t>Я</a:t>
             </a:r>
             <a:r>
-              <a:rPr lang="ru-RU" sz="2400" dirty="0"/>
+              <a:rPr lang="ru-RU" sz="2400" dirty="0">
+                <a:latin typeface="Montserrat" panose="00000500000000000000" pitchFamily="2" charset="-52"/>
+              </a:rPr>
               <a:t>ндекс Лицей</a:t>
             </a:r>
           </a:p>
@@ -4203,7 +4257,7 @@
         <p:spPr>
           <a:xfrm>
             <a:off x="4515274" y="461076"/>
-            <a:ext cx="3161443" cy="646331"/>
+            <a:ext cx="3512500" cy="646331"/>
           </a:xfrm>
           <a:prstGeom prst="rect">
             <a:avLst/>
@@ -4218,7 +4272,7 @@
           <a:p>
             <a:r>
               <a:rPr lang="ru-RU" sz="3600" dirty="0">
-                <a:latin typeface="Roboto" panose="02000000000000000000" pitchFamily="2" charset="0"/>
+                <a:latin typeface="Montserrat" panose="00000500000000000000" pitchFamily="2" charset="-52"/>
                 <a:ea typeface="Roboto" panose="02000000000000000000" pitchFamily="2" charset="0"/>
               </a:rPr>
               <a:t>Идея проекта</a:t>
@@ -4241,7 +4295,7 @@
         <p:spPr>
           <a:xfrm>
             <a:off x="456886" y="1899193"/>
-            <a:ext cx="8864980" cy="830997"/>
+            <a:ext cx="8864980" cy="1200329"/>
           </a:xfrm>
           <a:prstGeom prst="rect">
             <a:avLst/>
@@ -4255,10 +4309,13 @@
           <a:lstStyle/>
           <a:p>
             <a:r>
-              <a:rPr lang="ru-RU" sz="2400" dirty="0"/>
+              <a:rPr lang="ru-RU" sz="2400" dirty="0">
+                <a:latin typeface="Montserrat" panose="00000500000000000000" pitchFamily="2" charset="-52"/>
+              </a:rPr>
               <a:t>Идея проекта состоит в том чтобы </a:t>
             </a:r>
             <a:endParaRPr lang="ru-RU" sz="2400" dirty="0">
+              <a:latin typeface="Montserrat" panose="00000500000000000000" pitchFamily="2" charset="-52"/>
               <a:ea typeface="+mn-lt"/>
               <a:cs typeface="+mn-lt"/>
             </a:endParaRPr>
@@ -4266,16 +4323,20 @@
           <a:p>
             <a:r>
               <a:rPr lang="ru-RU" sz="2400" dirty="0">
+                <a:latin typeface="Montserrat" panose="00000500000000000000" pitchFamily="2" charset="-52"/>
                 <a:ea typeface="+mn-lt"/>
                 <a:cs typeface="+mn-lt"/>
               </a:rPr>
               <a:t>создать интернет-магазин для продажи продуктов онлайн</a:t>
             </a:r>
             <a:r>
-              <a:rPr lang="en-US" sz="2400" dirty="0"/>
+              <a:rPr lang="en-US" sz="2400" dirty="0">
+                <a:latin typeface="Montserrat" panose="00000500000000000000" pitchFamily="2" charset="-52"/>
+              </a:rPr>
               <a:t>.</a:t>
             </a:r>
             <a:endParaRPr lang="ru-RU" sz="2400" dirty="0">
+              <a:latin typeface="Montserrat" panose="00000500000000000000" pitchFamily="2" charset="-52"/>
               <a:cs typeface="Calibri"/>
             </a:endParaRPr>
           </a:p>
@@ -4296,7 +4357,7 @@
         <p:spPr>
           <a:xfrm>
             <a:off x="459197" y="3243875"/>
-            <a:ext cx="7349961" cy="830997"/>
+            <a:ext cx="9038052" cy="830997"/>
           </a:xfrm>
           <a:prstGeom prst="rect">
             <a:avLst/>
@@ -4310,17 +4371,25 @@
           <a:lstStyle/>
           <a:p>
             <a:r>
-              <a:rPr lang="ru-RU" sz="2400" dirty="0"/>
+              <a:rPr lang="ru-RU" sz="2400" dirty="0">
+                <a:latin typeface="Montserrat" panose="00000500000000000000" pitchFamily="2" charset="-52"/>
+              </a:rPr>
               <a:t>Исходя из идеи, проект можно использовать в разных </a:t>
             </a:r>
-            <a:endParaRPr lang="en-US" sz="2400"/>
-          </a:p>
-          <a:p>
-            <a:r>
-              <a:rPr lang="ru-RU" sz="2400" dirty="0"/>
+            <a:endParaRPr lang="en-US" sz="2400">
+              <a:latin typeface="Montserrat" panose="00000500000000000000" pitchFamily="2" charset="-52"/>
+            </a:endParaRPr>
+          </a:p>
+          <a:p>
+            <a:r>
+              <a:rPr lang="ru-RU" sz="2400" dirty="0">
+                <a:latin typeface="Montserrat" panose="00000500000000000000" pitchFamily="2" charset="-52"/>
+              </a:rPr>
               <a:t>условиях связанных с продажей товаров онлайн.</a:t>
             </a:r>
-            <a:endParaRPr lang="en-US" dirty="0"/>
+            <a:endParaRPr lang="en-US" dirty="0">
+              <a:latin typeface="Montserrat" panose="00000500000000000000" pitchFamily="2" charset="-52"/>
+            </a:endParaRPr>
           </a:p>
         </p:txBody>
       </p:sp>
@@ -4383,7 +4452,9 @@
           <a:lstStyle/>
           <a:p>
             <a:r>
-              <a:rPr lang="ru-RU" sz="4000" dirty="0"/>
+              <a:rPr lang="ru-RU" sz="4000" dirty="0">
+                <a:latin typeface="Montserrat" panose="00000500000000000000" pitchFamily="2" charset="-52"/>
+              </a:rPr>
               <a:t>Регистрация</a:t>
             </a:r>
           </a:p>
@@ -4478,13 +4549,17 @@
           <a:lstStyle/>
           <a:p>
             <a:r>
-              <a:rPr lang="ru-RU" sz="4000" dirty="0"/>
+              <a:rPr lang="ru-RU" sz="4000" dirty="0">
+                <a:latin typeface="Montserrat" panose="00000500000000000000" pitchFamily="2" charset="-52"/>
+              </a:rPr>
               <a:t>Авторизация</a:t>
             </a:r>
           </a:p>
           <a:p>
             <a:pPr algn="l"/>
-            <a:endParaRPr lang="ru-RU" sz="4000" dirty="0"/>
+            <a:endParaRPr lang="ru-RU" sz="4000" dirty="0">
+              <a:latin typeface="Montserrat" panose="00000500000000000000" pitchFamily="2" charset="-52"/>
+            </a:endParaRPr>
           </a:p>
         </p:txBody>
       </p:sp>
@@ -4533,7 +4608,7 @@
         <p:spPr>
           <a:xfrm>
             <a:off x="4561821" y="414388"/>
-            <a:ext cx="2786340" cy="646331"/>
+            <a:ext cx="3105337" cy="646331"/>
           </a:xfrm>
           <a:prstGeom prst="rect">
             <a:avLst/>
@@ -4548,7 +4623,7 @@
           <a:p>
             <a:r>
               <a:rPr lang="ru-RU" sz="3600" dirty="0">
-                <a:latin typeface="Roboto" panose="02000000000000000000" pitchFamily="2" charset="0"/>
+                <a:latin typeface="Montserrat" panose="00000500000000000000" pitchFamily="2" charset="-52"/>
                 <a:ea typeface="Roboto" panose="02000000000000000000" pitchFamily="2" charset="0"/>
               </a:rPr>
               <a:t>Реализация</a:t>
@@ -4571,7 +4646,7 @@
         <p:spPr>
           <a:xfrm>
             <a:off x="1127448" y="1378836"/>
-            <a:ext cx="6315703" cy="523220"/>
+            <a:ext cx="7792518" cy="523220"/>
           </a:xfrm>
           <a:prstGeom prst="rect">
             <a:avLst/>
@@ -4585,15 +4660,21 @@
           <a:lstStyle/>
           <a:p>
             <a:r>
-              <a:rPr lang="ru-RU" sz="2800" dirty="0"/>
+              <a:rPr lang="ru-RU" sz="2800" dirty="0">
+                <a:latin typeface="Montserrat" panose="00000500000000000000" pitchFamily="2" charset="-52"/>
+              </a:rPr>
               <a:t>В проекте реализованы такие функции</a:t>
             </a:r>
             <a:r>
-              <a:rPr lang="en-US" sz="2800" dirty="0"/>
+              <a:rPr lang="en-US" sz="2800" dirty="0">
+                <a:latin typeface="Montserrat" panose="00000500000000000000" pitchFamily="2" charset="-52"/>
+              </a:rPr>
               <a:t>:</a:t>
             </a:r>
             <a:r>
-              <a:rPr lang="ru-RU" sz="2800" dirty="0"/>
+              <a:rPr lang="ru-RU" sz="2800" dirty="0">
+                <a:latin typeface="Montserrat" panose="00000500000000000000" pitchFamily="2" charset="-52"/>
+              </a:rPr>
               <a:t> </a:t>
             </a:r>
           </a:p>
@@ -4627,7 +4708,9 @@
           </a:bodyPr>
           <a:lstStyle/>
           <a:p>
-            <a:endParaRPr lang="ru-RU" dirty="0"/>
+            <a:endParaRPr lang="ru-RU" dirty="0">
+              <a:latin typeface="Montserrat" panose="00000500000000000000" pitchFamily="2" charset="-52"/>
+            </a:endParaRPr>
           </a:p>
         </p:txBody>
       </p:sp>
@@ -4664,7 +4747,9 @@
               <a:buAutoNum type="arabicPeriod"/>
             </a:pPr>
             <a:r>
-              <a:rPr lang="ru-RU" sz="2400" dirty="0"/>
+              <a:rPr lang="ru-RU" sz="2400" dirty="0">
+                <a:latin typeface="Montserrat" panose="00000500000000000000" pitchFamily="2" charset="-52"/>
+              </a:rPr>
               <a:t>* Добавление продукта.</a:t>
             </a:r>
           </a:p>
@@ -4674,11 +4759,15 @@
               <a:buAutoNum type="arabicPeriod"/>
             </a:pPr>
             <a:r>
-              <a:rPr lang="en-US" sz="2400" dirty="0"/>
+              <a:rPr lang="en-US" sz="2400" dirty="0">
+                <a:latin typeface="Montserrat" panose="00000500000000000000" pitchFamily="2" charset="-52"/>
+              </a:rPr>
               <a:t>* </a:t>
             </a:r>
             <a:r>
-              <a:rPr lang="ru-RU" sz="2400" dirty="0"/>
+              <a:rPr lang="ru-RU" sz="2400" dirty="0">
+                <a:latin typeface="Montserrat" panose="00000500000000000000" pitchFamily="2" charset="-52"/>
+              </a:rPr>
               <a:t>Обновление продукта.</a:t>
             </a:r>
           </a:p>
@@ -4688,7 +4777,9 @@
               <a:buAutoNum type="arabicPeriod"/>
             </a:pPr>
             <a:r>
-              <a:rPr lang="ru-RU" sz="2400" dirty="0"/>
+              <a:rPr lang="ru-RU" sz="2400" dirty="0">
+                <a:latin typeface="Montserrat" panose="00000500000000000000" pitchFamily="2" charset="-52"/>
+              </a:rPr>
               <a:t>* Удаление продукта.</a:t>
             </a:r>
           </a:p>
@@ -4698,7 +4789,9 @@
               <a:buAutoNum type="arabicPeriod"/>
             </a:pPr>
             <a:r>
-              <a:rPr lang="ru-RU" sz="2400" dirty="0"/>
+              <a:rPr lang="ru-RU" sz="2400" dirty="0">
+                <a:latin typeface="Montserrat" panose="00000500000000000000" pitchFamily="2" charset="-52"/>
+              </a:rPr>
               <a:t>Покупка продукта.</a:t>
             </a:r>
           </a:p>
@@ -4707,7 +4800,9 @@
               <a:buAutoNum type="arabicPeriod"/>
             </a:pPr>
             <a:r>
-              <a:rPr lang="ru-RU" sz="2400" dirty="0"/>
+              <a:rPr lang="ru-RU" sz="2400" dirty="0">
+                <a:latin typeface="Montserrat" panose="00000500000000000000" pitchFamily="2" charset="-52"/>
+              </a:rPr>
               <a:t>Добавления товара в корзину.</a:t>
             </a:r>
           </a:p>
@@ -4716,7 +4811,9 @@
               <a:buAutoNum type="arabicPeriod"/>
             </a:pPr>
             <a:r>
-              <a:rPr lang="ru-RU" sz="2400" dirty="0"/>
+              <a:rPr lang="ru-RU" sz="2400" dirty="0">
+                <a:latin typeface="Montserrat" panose="00000500000000000000" pitchFamily="2" charset="-52"/>
+              </a:rPr>
               <a:t>Оформление заказа.</a:t>
             </a:r>
           </a:p>
@@ -4726,7 +4823,9 @@
               <a:buAutoNum type="arabicPeriod"/>
             </a:pPr>
             <a:r>
-              <a:rPr lang="ru-RU" sz="2400" dirty="0"/>
+              <a:rPr lang="ru-RU" sz="2400" dirty="0">
+                <a:latin typeface="Montserrat" panose="00000500000000000000" pitchFamily="2" charset="-52"/>
+              </a:rPr>
               <a:t>Просмотр личного кабинета.</a:t>
             </a:r>
           </a:p>
@@ -4736,7 +4835,9 @@
               <a:buAutoNum type="arabicPeriod"/>
             </a:pPr>
             <a:r>
-              <a:rPr lang="ru-RU" sz="2400" dirty="0"/>
+              <a:rPr lang="ru-RU" sz="2400" dirty="0">
+                <a:latin typeface="Montserrat" panose="00000500000000000000" pitchFamily="2" charset="-52"/>
+              </a:rPr>
               <a:t>Покупка.</a:t>
             </a:r>
           </a:p>
@@ -4745,7 +4846,9 @@
               <a:buAutoNum type="arabicPeriod"/>
             </a:pPr>
             <a:r>
-              <a:rPr lang="ru-RU" sz="2400" dirty="0"/>
+              <a:rPr lang="ru-RU" sz="2400" dirty="0">
+                <a:latin typeface="Montserrat" panose="00000500000000000000" pitchFamily="2" charset="-52"/>
+              </a:rPr>
               <a:t>Регистрация пользователя.</a:t>
             </a:r>
           </a:p>
@@ -4755,7 +4858,9 @@
               <a:buAutoNum type="arabicPeriod"/>
             </a:pPr>
             <a:r>
-              <a:rPr lang="ru-RU" sz="2400" dirty="0"/>
+              <a:rPr lang="ru-RU" sz="2400" dirty="0">
+                <a:latin typeface="Montserrat" panose="00000500000000000000" pitchFamily="2" charset="-52"/>
+              </a:rPr>
               <a:t>Авторизация пользователя.</a:t>
             </a:r>
           </a:p>
@@ -4765,7 +4870,9 @@
               <a:buAutoNum type="arabicPeriod"/>
             </a:pPr>
             <a:r>
-              <a:rPr lang="ru-RU" sz="2400" dirty="0"/>
+              <a:rPr lang="ru-RU" sz="2400" dirty="0">
+                <a:latin typeface="Montserrat" panose="00000500000000000000" pitchFamily="2" charset="-52"/>
+              </a:rPr>
               <a:t>Ведение статистики пользователя.</a:t>
             </a:r>
           </a:p>
@@ -4800,7 +4907,9 @@
           <a:lstStyle/>
           <a:p>
             <a:r>
-              <a:rPr lang="ru-RU" dirty="0"/>
+              <a:rPr lang="ru-RU" dirty="0">
+                <a:latin typeface="Montserrat" panose="00000500000000000000" pitchFamily="2" charset="-52"/>
+              </a:rPr>
               <a:t>* - некоторые функции могут использовать только администраторы</a:t>
             </a:r>
           </a:p>
@@ -4851,7 +4960,7 @@
         <p:spPr>
           <a:xfrm>
             <a:off x="3831598" y="467996"/>
-            <a:ext cx="4528804" cy="646331"/>
+            <a:ext cx="4979248" cy="646331"/>
           </a:xfrm>
           <a:prstGeom prst="rect">
             <a:avLst/>
@@ -4866,7 +4975,7 @@
           <a:p>
             <a:r>
               <a:rPr lang="ru-RU" sz="3600" dirty="0">
-                <a:latin typeface="Roboto" panose="02000000000000000000" pitchFamily="2" charset="0"/>
+                <a:latin typeface="Montserrat" panose="00000500000000000000" pitchFamily="2" charset="-52"/>
                 <a:ea typeface="Roboto" panose="02000000000000000000" pitchFamily="2" charset="0"/>
               </a:rPr>
               <a:t>Программная часть</a:t>
@@ -4889,7 +4998,7 @@
         <p:spPr>
           <a:xfrm>
             <a:off x="1343472" y="1655473"/>
-            <a:ext cx="5384616" cy="830997"/>
+            <a:ext cx="6664004" cy="830997"/>
           </a:xfrm>
           <a:prstGeom prst="rect">
             <a:avLst/>
@@ -4903,37 +5012,55 @@
           <a:lstStyle/>
           <a:p>
             <a:r>
-              <a:rPr lang="ru-RU" sz="2400" dirty="0"/>
+              <a:rPr lang="ru-RU" sz="2400" dirty="0">
+                <a:latin typeface="Montserrat" panose="00000500000000000000" pitchFamily="2" charset="-52"/>
+              </a:rPr>
               <a:t>Для создания использовался </a:t>
             </a:r>
             <a:r>
-              <a:rPr lang="ru-RU" sz="2400" dirty="0" err="1"/>
+              <a:rPr lang="ru-RU" sz="2400" dirty="0" err="1">
+                <a:latin typeface="Montserrat" panose="00000500000000000000" pitchFamily="2" charset="-52"/>
+              </a:rPr>
               <a:t>яп</a:t>
             </a:r>
             <a:r>
-              <a:rPr lang="ru-RU" sz="2400" dirty="0"/>
+              <a:rPr lang="ru-RU" sz="2400" dirty="0">
+                <a:latin typeface="Montserrat" panose="00000500000000000000" pitchFamily="2" charset="-52"/>
+              </a:rPr>
               <a:t> </a:t>
             </a:r>
             <a:r>
-              <a:rPr lang="en-US" sz="2400" dirty="0"/>
+              <a:rPr lang="en-US" sz="2400" dirty="0">
+                <a:latin typeface="Montserrat" panose="00000500000000000000" pitchFamily="2" charset="-52"/>
+              </a:rPr>
               <a:t>Python</a:t>
             </a:r>
             <a:r>
-              <a:rPr lang="ru-RU" sz="2400" dirty="0"/>
+              <a:rPr lang="ru-RU" sz="2400" dirty="0">
+                <a:latin typeface="Montserrat" panose="00000500000000000000" pitchFamily="2" charset="-52"/>
+              </a:rPr>
               <a:t>.</a:t>
             </a:r>
             <a:br>
-              <a:rPr lang="en-US" sz="2400" dirty="0"/>
+              <a:rPr lang="en-US" sz="2400" dirty="0">
+                <a:latin typeface="Montserrat" panose="00000500000000000000" pitchFamily="2" charset="-52"/>
+              </a:rPr>
             </a:br>
             <a:r>
-              <a:rPr lang="ru-RU" sz="2400" dirty="0"/>
+              <a:rPr lang="ru-RU" sz="2400" dirty="0">
+                <a:latin typeface="Montserrat" panose="00000500000000000000" pitchFamily="2" charset="-52"/>
+              </a:rPr>
               <a:t>Так же библиотеки</a:t>
             </a:r>
             <a:r>
-              <a:rPr lang="en-US" sz="2400" dirty="0"/>
+              <a:rPr lang="en-US" sz="2400" dirty="0">
+                <a:latin typeface="Montserrat" panose="00000500000000000000" pitchFamily="2" charset="-52"/>
+              </a:rPr>
               <a:t>:</a:t>
             </a:r>
-            <a:endParaRPr lang="ru-RU" sz="2400" dirty="0"/>
+            <a:endParaRPr lang="ru-RU" sz="2400" dirty="0">
+              <a:latin typeface="Montserrat" panose="00000500000000000000" pitchFamily="2" charset="-52"/>
+            </a:endParaRPr>
           </a:p>
         </p:txBody>
       </p:sp>
@@ -4969,14 +5096,19 @@
               <a:buAutoNum type="arabicPeriod"/>
             </a:pPr>
             <a:r>
-              <a:rPr lang="ru-RU" sz="2400" dirty="0" err="1"/>
+              <a:rPr lang="ru-RU" sz="2400" dirty="0" err="1">
+                <a:latin typeface="Montserrat" panose="00000500000000000000" pitchFamily="2" charset="-52"/>
+              </a:rPr>
               <a:t>Flask</a:t>
             </a:r>
             <a:r>
-              <a:rPr lang="ru-RU" sz="2400" dirty="0"/>
+              <a:rPr lang="ru-RU" sz="2400" dirty="0">
+                <a:latin typeface="Montserrat" panose="00000500000000000000" pitchFamily="2" charset="-52"/>
+              </a:rPr>
               <a:t> – библиотека для создания и поддержки сервера.</a:t>
             </a:r>
             <a:endParaRPr lang="ru-RU" dirty="0">
+              <a:latin typeface="Montserrat" panose="00000500000000000000" pitchFamily="2" charset="-52"/>
               <a:cs typeface="Calibri"/>
             </a:endParaRPr>
           </a:p>
@@ -4986,24 +5118,29 @@
             </a:pPr>
             <a:r>
               <a:rPr lang="ru-RU" sz="2400" dirty="0" err="1">
+                <a:latin typeface="Montserrat" panose="00000500000000000000" pitchFamily="2" charset="-52"/>
                 <a:cs typeface="Calibri"/>
               </a:rPr>
               <a:t>Flask_restful</a:t>
             </a:r>
             <a:r>
               <a:rPr lang="ru-RU" sz="2400" dirty="0">
+                <a:latin typeface="Montserrat" panose="00000500000000000000" pitchFamily="2" charset="-52"/>
                 <a:cs typeface="Calibri"/>
               </a:rPr>
               <a:t> - </a:t>
             </a:r>
             <a:r>
               <a:rPr lang="ru-RU" sz="2400" dirty="0">
+                <a:latin typeface="Montserrat" panose="00000500000000000000" pitchFamily="2" charset="-52"/>
                 <a:ea typeface="+mn-lt"/>
                 <a:cs typeface="+mn-lt"/>
               </a:rPr>
               <a:t>библиотека для работы с API.</a:t>
             </a:r>
-            <a:endParaRPr lang="ru-RU" dirty="0"/>
+            <a:endParaRPr lang="ru-RU" dirty="0">
+              <a:latin typeface="Montserrat" panose="00000500000000000000" pitchFamily="2" charset="-52"/>
+            </a:endParaRPr>
           </a:p>
           <a:p>
             <a:pPr marL="342900" indent="-342900">
@@ -5012,24 +5149,28 @@
             </a:pPr>
             <a:r>
               <a:rPr lang="ru-RU" sz="2400" dirty="0" err="1">
+                <a:latin typeface="Montserrat" panose="00000500000000000000" pitchFamily="2" charset="-52"/>
                 <a:cs typeface="Calibri"/>
               </a:rPr>
               <a:t>Flask-login</a:t>
             </a:r>
             <a:r>
               <a:rPr lang="ru-RU" sz="2400" dirty="0">
+                <a:latin typeface="Montserrat" panose="00000500000000000000" pitchFamily="2" charset="-52"/>
                 <a:cs typeface="Calibri"/>
               </a:rPr>
               <a:t> - </a:t>
             </a:r>
             <a:r>
               <a:rPr lang="ru-RU" sz="2400" dirty="0">
+                <a:latin typeface="Montserrat" panose="00000500000000000000" pitchFamily="2" charset="-52"/>
                 <a:ea typeface="+mn-lt"/>
                 <a:cs typeface="+mn-lt"/>
               </a:rPr>
               <a:t>библиотека для работы с пользователями(авторизация, регистрация и т.д.).</a:t>
             </a:r>
             <a:endParaRPr lang="ru-RU" sz="2400" dirty="0">
+              <a:latin typeface="Montserrat" panose="00000500000000000000" pitchFamily="2" charset="-52"/>
               <a:cs typeface="Calibri"/>
             </a:endParaRPr>
           </a:p>
@@ -5039,10 +5180,13 @@
               <a:buAutoNum type="arabicPeriod"/>
             </a:pPr>
             <a:r>
-              <a:rPr lang="ru-RU" sz="2400" dirty="0"/>
+              <a:rPr lang="ru-RU" sz="2400" dirty="0">
+                <a:latin typeface="Montserrat" panose="00000500000000000000" pitchFamily="2" charset="-52"/>
+              </a:rPr>
               <a:t>Jinja2 - Шаблонизатор.</a:t>
             </a:r>
             <a:endParaRPr lang="ru-RU" sz="2400" dirty="0">
+              <a:latin typeface="Montserrat" panose="00000500000000000000" pitchFamily="2" charset="-52"/>
               <a:cs typeface="Calibri"/>
             </a:endParaRPr>
           </a:p>
@@ -5052,15 +5196,21 @@
               <a:buAutoNum type="arabicPeriod"/>
             </a:pPr>
             <a:r>
-              <a:rPr lang="en-US" sz="2400" dirty="0" err="1"/>
+              <a:rPr lang="en-US" sz="2400" dirty="0" err="1">
+                <a:latin typeface="Montserrat" panose="00000500000000000000" pitchFamily="2" charset="-52"/>
+              </a:rPr>
               <a:t>SqlAlchemy</a:t>
             </a:r>
             <a:r>
-              <a:rPr lang="en-US" sz="2400" dirty="0"/>
+              <a:rPr lang="en-US" sz="2400" dirty="0">
+                <a:latin typeface="Montserrat" panose="00000500000000000000" pitchFamily="2" charset="-52"/>
+              </a:rPr>
               <a:t> </a:t>
             </a:r>
             <a:r>
-              <a:rPr lang="ru-RU" sz="2400" dirty="0"/>
+              <a:rPr lang="ru-RU" sz="2400" dirty="0">
+                <a:latin typeface="Montserrat" panose="00000500000000000000" pitchFamily="2" charset="-52"/>
+              </a:rPr>
               <a:t>– используется для работы с базой данных.</a:t>
             </a:r>
           </a:p>
@@ -5111,7 +5261,7 @@
         <p:spPr>
           <a:xfrm>
             <a:off x="5277506" y="496641"/>
-            <a:ext cx="1636987" cy="646331"/>
+            <a:ext cx="1766830" cy="646331"/>
           </a:xfrm>
           <a:prstGeom prst="rect">
             <a:avLst/>
@@ -5126,13 +5276,13 @@
           <a:p>
             <a:r>
               <a:rPr lang="ru-RU" sz="3600" dirty="0">
-                <a:latin typeface="Roboto" panose="02000000000000000000" pitchFamily="2" charset="0"/>
+                <a:latin typeface="Montserrat" panose="00000500000000000000" pitchFamily="2" charset="-52"/>
                 <a:ea typeface="Roboto" panose="02000000000000000000" pitchFamily="2" charset="0"/>
               </a:rPr>
               <a:t>Вывод</a:t>
             </a:r>
             <a:endParaRPr lang="ru-RU" dirty="0">
-              <a:latin typeface="Roboto" panose="02000000000000000000" pitchFamily="2" charset="0"/>
+              <a:latin typeface="Montserrat" panose="00000500000000000000" pitchFamily="2" charset="-52"/>
               <a:ea typeface="Roboto" panose="02000000000000000000" pitchFamily="2" charset="0"/>
             </a:endParaRPr>
           </a:p>
@@ -5153,7 +5303,7 @@
         <p:spPr>
           <a:xfrm>
             <a:off x="551384" y="1340768"/>
-            <a:ext cx="10405413" cy="1938992"/>
+            <a:ext cx="11325536" cy="1938992"/>
           </a:xfrm>
           <a:prstGeom prst="rect">
             <a:avLst/>
@@ -5171,15 +5321,21 @@
               <a:buAutoNum type="arabicPeriod"/>
             </a:pPr>
             <a:r>
-              <a:rPr lang="ru-RU" sz="2400" dirty="0"/>
+              <a:rPr lang="ru-RU" sz="2400" dirty="0">
+                <a:latin typeface="Montserrat" panose="00000500000000000000" pitchFamily="2" charset="-52"/>
+              </a:rPr>
               <a:t>Был спроектирован интерфейс с помощью библиотеки </a:t>
             </a:r>
             <a:r>
-              <a:rPr lang="ru-RU" sz="2400" dirty="0" err="1"/>
+              <a:rPr lang="ru-RU" sz="2400" dirty="0" err="1">
+                <a:latin typeface="Montserrat" panose="00000500000000000000" pitchFamily="2" charset="-52"/>
+              </a:rPr>
               <a:t>Flask</a:t>
             </a:r>
             <a:r>
-              <a:rPr lang="ru-RU" sz="2400" dirty="0"/>
+              <a:rPr lang="ru-RU" sz="2400" dirty="0">
+                <a:latin typeface="Montserrat" panose="00000500000000000000" pitchFamily="2" charset="-52"/>
+              </a:rPr>
               <a:t>.</a:t>
             </a:r>
           </a:p>
@@ -5189,25 +5345,37 @@
               <a:buAutoNum type="arabicPeriod"/>
             </a:pPr>
             <a:r>
-              <a:rPr lang="ru-RU" sz="2400" dirty="0"/>
+              <a:rPr lang="ru-RU" sz="2400" dirty="0">
+                <a:latin typeface="Montserrat" panose="00000500000000000000" pitchFamily="2" charset="-52"/>
+              </a:rPr>
               <a:t>Была создана база данных для хранения товаров и пользователей</a:t>
             </a:r>
             <a:br>
-              <a:rPr lang="ru-RU" sz="2400" dirty="0"/>
+              <a:rPr lang="ru-RU" sz="2400" dirty="0">
+                <a:latin typeface="Montserrat" panose="00000500000000000000" pitchFamily="2" charset="-52"/>
+              </a:rPr>
             </a:br>
             <a:r>
-              <a:rPr lang="en-US" sz="2400" dirty="0"/>
+              <a:rPr lang="en-US" sz="2400" dirty="0">
+                <a:latin typeface="Montserrat" panose="00000500000000000000" pitchFamily="2" charset="-52"/>
+              </a:rPr>
               <a:t> </a:t>
             </a:r>
             <a:r>
-              <a:rPr lang="ru-RU" sz="2400" dirty="0"/>
+              <a:rPr lang="ru-RU" sz="2400" dirty="0">
+                <a:latin typeface="Montserrat" panose="00000500000000000000" pitchFamily="2" charset="-52"/>
+              </a:rPr>
               <a:t>с использованием модуля </a:t>
             </a:r>
             <a:r>
-              <a:rPr lang="ru-RU" sz="2400" dirty="0" err="1"/>
+              <a:rPr lang="ru-RU" sz="2400" dirty="0" err="1">
+                <a:latin typeface="Montserrat" panose="00000500000000000000" pitchFamily="2" charset="-52"/>
+              </a:rPr>
               <a:t>SqlAlchemy</a:t>
             </a:r>
-            <a:endParaRPr lang="en-US" sz="2400"/>
+            <a:endParaRPr lang="en-US" sz="2400">
+              <a:latin typeface="Montserrat" panose="00000500000000000000" pitchFamily="2" charset="-52"/>
+            </a:endParaRPr>
           </a:p>
           <a:p>
             <a:pPr marL="342900" indent="-342900">
@@ -5215,16 +5383,21 @@
               <a:buAutoNum type="arabicPeriod"/>
             </a:pPr>
             <a:r>
-              <a:rPr lang="ru-RU" sz="2400" dirty="0"/>
+              <a:rPr lang="ru-RU" sz="2400" dirty="0">
+                <a:latin typeface="Montserrat" panose="00000500000000000000" pitchFamily="2" charset="-52"/>
+              </a:rPr>
               <a:t>В совокупности всех применённых технологий получается </a:t>
             </a:r>
           </a:p>
           <a:p>
             <a:r>
-              <a:rPr lang="ru-RU" sz="2400" dirty="0"/>
+              <a:rPr lang="ru-RU" sz="2400" dirty="0">
+                <a:latin typeface="Montserrat" panose="00000500000000000000" pitchFamily="2" charset="-52"/>
+              </a:rPr>
               <a:t>            интернет-магазин для продажи товаров онлайн. </a:t>
             </a:r>
             <a:endParaRPr lang="ru-RU" sz="2400" dirty="0">
+              <a:latin typeface="Montserrat" panose="00000500000000000000" pitchFamily="2" charset="-52"/>
               <a:cs typeface="Calibri"/>
             </a:endParaRPr>
           </a:p>

</xml_diff>